<commit_message>
Add content for DevTools formation
</commit_message>
<xml_diff>
--- a/Vos demandes - Javascript.pptx
+++ b/Vos demandes - Javascript.pptx
@@ -5,7 +5,7 @@
     <p:sldMasterId id="2147483677" r:id="rId1"/>
   </p:sldMasterIdLst>
   <p:notesMasterIdLst>
-    <p:notesMasterId r:id="rId28"/>
+    <p:notesMasterId r:id="rId30"/>
   </p:notesMasterIdLst>
   <p:sldIdLst>
     <p:sldId id="256" r:id="rId2"/>
@@ -34,42 +34,44 @@
     <p:sldId id="314" r:id="rId25"/>
     <p:sldId id="312" r:id="rId26"/>
     <p:sldId id="310" r:id="rId27"/>
+    <p:sldId id="319" r:id="rId28"/>
+    <p:sldId id="320" r:id="rId29"/>
   </p:sldIdLst>
   <p:sldSz cx="9144000" cy="5143500" type="screen16x9"/>
   <p:notesSz cx="6858000" cy="9144000"/>
   <p:embeddedFontLst>
     <p:embeddedFont>
       <p:font typeface="Exo 2" panose="020B0604020202020204" charset="0"/>
-      <p:regular r:id="rId29"/>
-      <p:bold r:id="rId30"/>
-      <p:italic r:id="rId31"/>
-      <p:boldItalic r:id="rId32"/>
+      <p:regular r:id="rId31"/>
+      <p:bold r:id="rId32"/>
+      <p:italic r:id="rId33"/>
+      <p:boldItalic r:id="rId34"/>
     </p:embeddedFont>
     <p:embeddedFont>
       <p:font typeface="Fira Sans Extra Condensed Medium" panose="020B0604020202020204" charset="0"/>
-      <p:regular r:id="rId33"/>
-      <p:bold r:id="rId34"/>
-      <p:italic r:id="rId35"/>
-      <p:boldItalic r:id="rId36"/>
+      <p:regular r:id="rId35"/>
+      <p:bold r:id="rId36"/>
+      <p:italic r:id="rId37"/>
+      <p:boldItalic r:id="rId38"/>
     </p:embeddedFont>
     <p:embeddedFont>
       <p:font typeface="Nunito Light" pitchFamily="2" charset="0"/>
-      <p:regular r:id="rId37"/>
-      <p:italic r:id="rId38"/>
+      <p:regular r:id="rId39"/>
+      <p:italic r:id="rId40"/>
     </p:embeddedFont>
     <p:embeddedFont>
       <p:font typeface="Roboto Condensed" panose="02000000000000000000" pitchFamily="2" charset="0"/>
-      <p:regular r:id="rId39"/>
-      <p:bold r:id="rId40"/>
-      <p:italic r:id="rId41"/>
-      <p:boldItalic r:id="rId42"/>
+      <p:regular r:id="rId41"/>
+      <p:bold r:id="rId42"/>
+      <p:italic r:id="rId43"/>
+      <p:boldItalic r:id="rId44"/>
     </p:embeddedFont>
     <p:embeddedFont>
       <p:font typeface="Roboto Condensed Light" panose="02000000000000000000" pitchFamily="2" charset="0"/>
-      <p:regular r:id="rId43"/>
-      <p:bold r:id="rId44"/>
-      <p:italic r:id="rId45"/>
-      <p:boldItalic r:id="rId46"/>
+      <p:regular r:id="rId45"/>
+      <p:bold r:id="rId46"/>
+      <p:italic r:id="rId47"/>
+      <p:boldItalic r:id="rId48"/>
     </p:embeddedFont>
   </p:embeddedFontLst>
   <p:defaultTextStyle>
@@ -2802,6 +2804,224 @@
     <p:extLst>
       <p:ext uri="{BB962C8B-B14F-4D97-AF65-F5344CB8AC3E}">
         <p14:creationId xmlns:p14="http://schemas.microsoft.com/office/powerpoint/2010/main" val="3564000099"/>
+      </p:ext>
+    </p:extLst>
+  </p:cSld>
+  <p:clrMapOvr>
+    <a:masterClrMapping/>
+  </p:clrMapOvr>
+</p:notes>
+</file>
+
+<file path=ppt/notesSlides/notesSlide27.xml><?xml version="1.0" encoding="utf-8"?>
+<p:notes xmlns:a="http://schemas.openxmlformats.org/drawingml/2006/main" xmlns:r="http://schemas.openxmlformats.org/officeDocument/2006/relationships" xmlns:p="http://schemas.openxmlformats.org/presentationml/2006/main" showMasterSp="0" showMasterPhAnim="0">
+  <p:cSld>
+    <p:spTree>
+      <p:nvGrpSpPr>
+        <p:cNvPr id="1" name="Shape 201"/>
+        <p:cNvGrpSpPr/>
+        <p:nvPr/>
+      </p:nvGrpSpPr>
+      <p:grpSpPr>
+        <a:xfrm>
+          <a:off x="0" y="0"/>
+          <a:ext cx="0" cy="0"/>
+          <a:chOff x="0" y="0"/>
+          <a:chExt cx="0" cy="0"/>
+        </a:xfrm>
+      </p:grpSpPr>
+      <p:sp>
+        <p:nvSpPr>
+          <p:cNvPr id="202" name="Google Shape;202;g9baafe93df_0_397:notes"/>
+          <p:cNvSpPr>
+            <a:spLocks noGrp="1" noRot="1" noChangeAspect="1"/>
+          </p:cNvSpPr>
+          <p:nvPr>
+            <p:ph type="sldImg" idx="2"/>
+          </p:nvPr>
+        </p:nvSpPr>
+        <p:spPr>
+          <a:xfrm>
+            <a:off x="381000" y="685800"/>
+            <a:ext cx="6096000" cy="3429000"/>
+          </a:xfrm>
+          <a:custGeom>
+            <a:avLst/>
+            <a:gdLst/>
+            <a:ahLst/>
+            <a:cxnLst/>
+            <a:rect l="l" t="t" r="r" b="b"/>
+            <a:pathLst>
+              <a:path w="120000" h="120000" extrusionOk="0">
+                <a:moveTo>
+                  <a:pt x="0" y="0"/>
+                </a:moveTo>
+                <a:lnTo>
+                  <a:pt x="120000" y="0"/>
+                </a:lnTo>
+                <a:lnTo>
+                  <a:pt x="120000" y="120000"/>
+                </a:lnTo>
+                <a:lnTo>
+                  <a:pt x="0" y="120000"/>
+                </a:lnTo>
+                <a:close/>
+              </a:path>
+            </a:pathLst>
+          </a:custGeom>
+        </p:spPr>
+      </p:sp>
+      <p:sp>
+        <p:nvSpPr>
+          <p:cNvPr id="203" name="Google Shape;203;g9baafe93df_0_397:notes"/>
+          <p:cNvSpPr txBox="1">
+            <a:spLocks noGrp="1"/>
+          </p:cNvSpPr>
+          <p:nvPr>
+            <p:ph type="body" idx="1"/>
+          </p:nvPr>
+        </p:nvSpPr>
+        <p:spPr>
+          <a:xfrm>
+            <a:off x="685800" y="4343400"/>
+            <a:ext cx="5486400" cy="4114800"/>
+          </a:xfrm>
+          <a:prstGeom prst="rect">
+            <a:avLst/>
+          </a:prstGeom>
+        </p:spPr>
+        <p:txBody>
+          <a:bodyPr spcFirstLastPara="1" wrap="square" lIns="91425" tIns="91425" rIns="91425" bIns="91425" anchor="t" anchorCtr="0">
+            <a:noAutofit/>
+          </a:bodyPr>
+          <a:lstStyle/>
+          <a:p>
+            <a:pPr marL="0" lvl="0" indent="0" algn="l" rtl="0">
+              <a:spcBef>
+                <a:spcPts val="0"/>
+              </a:spcBef>
+              <a:spcAft>
+                <a:spcPts val="0"/>
+              </a:spcAft>
+              <a:buNone/>
+            </a:pPr>
+            <a:endParaRPr/>
+          </a:p>
+        </p:txBody>
+      </p:sp>
+    </p:spTree>
+    <p:extLst>
+      <p:ext uri="{BB962C8B-B14F-4D97-AF65-F5344CB8AC3E}">
+        <p14:creationId xmlns:p14="http://schemas.microsoft.com/office/powerpoint/2010/main" val="4047216088"/>
+      </p:ext>
+    </p:extLst>
+  </p:cSld>
+  <p:clrMapOvr>
+    <a:masterClrMapping/>
+  </p:clrMapOvr>
+</p:notes>
+</file>
+
+<file path=ppt/notesSlides/notesSlide28.xml><?xml version="1.0" encoding="utf-8"?>
+<p:notes xmlns:a="http://schemas.openxmlformats.org/drawingml/2006/main" xmlns:r="http://schemas.openxmlformats.org/officeDocument/2006/relationships" xmlns:p="http://schemas.openxmlformats.org/presentationml/2006/main" showMasterSp="0" showMasterPhAnim="0">
+  <p:cSld>
+    <p:spTree>
+      <p:nvGrpSpPr>
+        <p:cNvPr id="1" name="Shape 253"/>
+        <p:cNvGrpSpPr/>
+        <p:nvPr/>
+      </p:nvGrpSpPr>
+      <p:grpSpPr>
+        <a:xfrm>
+          <a:off x="0" y="0"/>
+          <a:ext cx="0" cy="0"/>
+          <a:chOff x="0" y="0"/>
+          <a:chExt cx="0" cy="0"/>
+        </a:xfrm>
+      </p:grpSpPr>
+      <p:sp>
+        <p:nvSpPr>
+          <p:cNvPr id="254" name="Google Shape;254;g9baafe93df_0_498:notes"/>
+          <p:cNvSpPr>
+            <a:spLocks noGrp="1" noRot="1" noChangeAspect="1"/>
+          </p:cNvSpPr>
+          <p:nvPr>
+            <p:ph type="sldImg" idx="2"/>
+          </p:nvPr>
+        </p:nvSpPr>
+        <p:spPr>
+          <a:xfrm>
+            <a:off x="381000" y="685800"/>
+            <a:ext cx="6096000" cy="3429000"/>
+          </a:xfrm>
+          <a:custGeom>
+            <a:avLst/>
+            <a:gdLst/>
+            <a:ahLst/>
+            <a:cxnLst/>
+            <a:rect l="l" t="t" r="r" b="b"/>
+            <a:pathLst>
+              <a:path w="120000" h="120000" extrusionOk="0">
+                <a:moveTo>
+                  <a:pt x="0" y="0"/>
+                </a:moveTo>
+                <a:lnTo>
+                  <a:pt x="120000" y="0"/>
+                </a:lnTo>
+                <a:lnTo>
+                  <a:pt x="120000" y="120000"/>
+                </a:lnTo>
+                <a:lnTo>
+                  <a:pt x="0" y="120000"/>
+                </a:lnTo>
+                <a:close/>
+              </a:path>
+            </a:pathLst>
+          </a:custGeom>
+        </p:spPr>
+      </p:sp>
+      <p:sp>
+        <p:nvSpPr>
+          <p:cNvPr id="255" name="Google Shape;255;g9baafe93df_0_498:notes"/>
+          <p:cNvSpPr txBox="1">
+            <a:spLocks noGrp="1"/>
+          </p:cNvSpPr>
+          <p:nvPr>
+            <p:ph type="body" idx="1"/>
+          </p:nvPr>
+        </p:nvSpPr>
+        <p:spPr>
+          <a:xfrm>
+            <a:off x="685800" y="4343400"/>
+            <a:ext cx="5486400" cy="4114800"/>
+          </a:xfrm>
+          <a:prstGeom prst="rect">
+            <a:avLst/>
+          </a:prstGeom>
+        </p:spPr>
+        <p:txBody>
+          <a:bodyPr spcFirstLastPara="1" wrap="square" lIns="91425" tIns="91425" rIns="91425" bIns="91425" anchor="t" anchorCtr="0">
+            <a:noAutofit/>
+          </a:bodyPr>
+          <a:lstStyle/>
+          <a:p>
+            <a:pPr marL="0" lvl="0" indent="0" algn="l" rtl="0">
+              <a:spcBef>
+                <a:spcPts val="0"/>
+              </a:spcBef>
+              <a:spcAft>
+                <a:spcPts val="0"/>
+              </a:spcAft>
+              <a:buNone/>
+            </a:pPr>
+            <a:endParaRPr/>
+          </a:p>
+        </p:txBody>
+      </p:sp>
+    </p:spTree>
+    <p:extLst>
+      <p:ext uri="{BB962C8B-B14F-4D97-AF65-F5344CB8AC3E}">
+        <p14:creationId xmlns:p14="http://schemas.microsoft.com/office/powerpoint/2010/main" val="3676215650"/>
       </p:ext>
     </p:extLst>
   </p:cSld>
@@ -11017,6 +11237,37 @@
           </a:prstGeom>
         </p:spPr>
       </p:pic>
+      <p:pic>
+        <p:nvPicPr>
+          <p:cNvPr id="8" name="Image 7">
+            <a:hlinkClick r:id="rId4"/>
+            <a:extLst>
+              <a:ext uri="{FF2B5EF4-FFF2-40B4-BE49-F238E27FC236}">
+                <a16:creationId xmlns:a16="http://schemas.microsoft.com/office/drawing/2014/main" id="{CA9D6E08-A258-4F5D-B221-12F39E71C891}"/>
+              </a:ext>
+            </a:extLst>
+          </p:cNvPr>
+          <p:cNvPicPr>
+            <a:picLocks noChangeAspect="1"/>
+          </p:cNvPicPr>
+          <p:nvPr/>
+        </p:nvPicPr>
+        <p:blipFill>
+          <a:blip r:embed="rId5"/>
+          <a:stretch>
+            <a:fillRect/>
+          </a:stretch>
+        </p:blipFill>
+        <p:spPr>
+          <a:xfrm>
+            <a:off x="8734425" y="0"/>
+            <a:ext cx="409575" cy="390525"/>
+          </a:xfrm>
+          <a:prstGeom prst="rect">
+            <a:avLst/>
+          </a:prstGeom>
+        </p:spPr>
+      </p:pic>
     </p:spTree>
     <p:extLst>
       <p:ext uri="{BB962C8B-B14F-4D97-AF65-F5344CB8AC3E}">
@@ -16040,6 +16291,37 @@
           </a:prstGeom>
         </p:spPr>
       </p:pic>
+      <p:pic>
+        <p:nvPicPr>
+          <p:cNvPr id="11" name="Image 10">
+            <a:hlinkClick r:id="rId5"/>
+            <a:extLst>
+              <a:ext uri="{FF2B5EF4-FFF2-40B4-BE49-F238E27FC236}">
+                <a16:creationId xmlns:a16="http://schemas.microsoft.com/office/drawing/2014/main" id="{2154E5E9-E771-45B4-957E-FF7A0B162985}"/>
+              </a:ext>
+            </a:extLst>
+          </p:cNvPr>
+          <p:cNvPicPr>
+            <a:picLocks noChangeAspect="1"/>
+          </p:cNvPicPr>
+          <p:nvPr/>
+        </p:nvPicPr>
+        <p:blipFill>
+          <a:blip r:embed="rId6"/>
+          <a:stretch>
+            <a:fillRect/>
+          </a:stretch>
+        </p:blipFill>
+        <p:spPr>
+          <a:xfrm>
+            <a:off x="8734425" y="0"/>
+            <a:ext cx="409575" cy="390525"/>
+          </a:xfrm>
+          <a:prstGeom prst="rect">
+            <a:avLst/>
+          </a:prstGeom>
+        </p:spPr>
+      </p:pic>
     </p:spTree>
     <p:extLst>
       <p:ext uri="{BB962C8B-B14F-4D97-AF65-F5344CB8AC3E}">
@@ -16777,6 +17059,775 @@
     <p:extLst>
       <p:ext uri="{BB962C8B-B14F-4D97-AF65-F5344CB8AC3E}">
         <p14:creationId xmlns:p14="http://schemas.microsoft.com/office/powerpoint/2010/main" val="1827333212"/>
+      </p:ext>
+    </p:extLst>
+  </p:cSld>
+  <p:clrMapOvr>
+    <a:masterClrMapping/>
+  </p:clrMapOvr>
+</p:sld>
+</file>
+
+<file path=ppt/slides/slide27.xml><?xml version="1.0" encoding="utf-8"?>
+<p:sld xmlns:a="http://schemas.openxmlformats.org/drawingml/2006/main" xmlns:r="http://schemas.openxmlformats.org/officeDocument/2006/relationships" xmlns:p="http://schemas.openxmlformats.org/presentationml/2006/main">
+  <p:cSld>
+    <p:spTree>
+      <p:nvGrpSpPr>
+        <p:cNvPr id="1" name="Shape 204"/>
+        <p:cNvGrpSpPr/>
+        <p:nvPr/>
+      </p:nvGrpSpPr>
+      <p:grpSpPr>
+        <a:xfrm>
+          <a:off x="0" y="0"/>
+          <a:ext cx="0" cy="0"/>
+          <a:chOff x="0" y="0"/>
+          <a:chExt cx="0" cy="0"/>
+        </a:xfrm>
+      </p:grpSpPr>
+      <p:sp>
+        <p:nvSpPr>
+          <p:cNvPr id="205" name="Google Shape;205;p37"/>
+          <p:cNvSpPr txBox="1">
+            <a:spLocks noGrp="1"/>
+          </p:cNvSpPr>
+          <p:nvPr>
+            <p:ph type="subTitle" idx="1"/>
+          </p:nvPr>
+        </p:nvSpPr>
+        <p:spPr>
+          <a:xfrm>
+            <a:off x="754114" y="2117977"/>
+            <a:ext cx="7796830" cy="2474193"/>
+          </a:xfrm>
+          <a:prstGeom prst="rect">
+            <a:avLst/>
+          </a:prstGeom>
+        </p:spPr>
+        <p:txBody>
+          <a:bodyPr spcFirstLastPara="1" wrap="square" lIns="91425" tIns="91425" rIns="91425" bIns="91425" anchor="t" anchorCtr="0">
+            <a:noAutofit/>
+          </a:bodyPr>
+          <a:lstStyle/>
+          <a:p>
+            <a:pPr marL="0" lvl="0" indent="0" algn="l" rtl="0">
+              <a:spcBef>
+                <a:spcPts val="0"/>
+              </a:spcBef>
+              <a:spcAft>
+                <a:spcPts val="0"/>
+              </a:spcAft>
+              <a:buNone/>
+            </a:pPr>
+            <a:r>
+              <a:rPr lang="en" dirty="0"/>
+              <a:t>Qu’est-ce qu’un événement : </a:t>
+            </a:r>
+            <a:br>
+              <a:rPr lang="en" dirty="0"/>
+            </a:br>
+            <a:endParaRPr lang="en" dirty="0"/>
+          </a:p>
+          <a:p>
+            <a:pPr marL="285750" lvl="0" indent="-285750" algn="l" rtl="0">
+              <a:spcBef>
+                <a:spcPts val="0"/>
+              </a:spcBef>
+              <a:spcAft>
+                <a:spcPts val="0"/>
+              </a:spcAft>
+              <a:buFont typeface="Wingdings" panose="05000000000000000000" pitchFamily="2" charset="2"/>
+              <a:buChar char="v"/>
+            </a:pPr>
+            <a:r>
+              <a:rPr lang="en" dirty="0"/>
+              <a:t>Les événement sont des actions ou des occurances qui se produise à un instant “t” et se produisant dans un système qui a été programmé. </a:t>
+            </a:r>
+          </a:p>
+          <a:p>
+            <a:pPr marL="285750" lvl="0" indent="-285750" algn="l" rtl="0">
+              <a:spcBef>
+                <a:spcPts val="0"/>
+              </a:spcBef>
+              <a:spcAft>
+                <a:spcPts val="0"/>
+              </a:spcAft>
+              <a:buFont typeface="Wingdings" panose="05000000000000000000" pitchFamily="2" charset="2"/>
+              <a:buChar char="v"/>
+            </a:pPr>
+            <a:r>
+              <a:rPr lang="en" dirty="0"/>
+              <a:t>Sont but est de déclancher une modification (du DOM part exemple) en réponse au signal  émis par cet événement. Les événements sont l’escence même des interaction que nous avons tous les jours avec notre mobile, tablette ou pc.</a:t>
+            </a:r>
+          </a:p>
+          <a:p>
+            <a:pPr marL="285750" lvl="0" indent="-285750" algn="l" rtl="0">
+              <a:spcBef>
+                <a:spcPts val="0"/>
+              </a:spcBef>
+              <a:spcAft>
+                <a:spcPts val="0"/>
+              </a:spcAft>
+              <a:buFont typeface="Wingdings" panose="05000000000000000000" pitchFamily="2" charset="2"/>
+              <a:buChar char="v"/>
+            </a:pPr>
+            <a:r>
+              <a:rPr lang="en" dirty="0"/>
+              <a:t>Il existe de nombreux événements, on pourrait par exemple nommer le “click”, le “mouseover”, le “scroll”,…</a:t>
+            </a:r>
+          </a:p>
+          <a:p>
+            <a:pPr marL="285750" lvl="0" indent="-285750" algn="l" rtl="0">
+              <a:spcBef>
+                <a:spcPts val="0"/>
+              </a:spcBef>
+              <a:spcAft>
+                <a:spcPts val="0"/>
+              </a:spcAft>
+              <a:buFont typeface="Wingdings" panose="05000000000000000000" pitchFamily="2" charset="2"/>
+              <a:buChar char="v"/>
+            </a:pPr>
+            <a:r>
+              <a:rPr lang="en" dirty="0"/>
+              <a:t>Chaque évenement possède sont propre gestionnaire / écouteur d’événement, ce dernier est généralement une instruction (une fonction JavaScript) qui est définit par le dévellopeur et qui sera exécuté une fois l’événement déclanché.</a:t>
+            </a:r>
+          </a:p>
+        </p:txBody>
+      </p:sp>
+      <p:sp>
+        <p:nvSpPr>
+          <p:cNvPr id="206" name="Google Shape;206;p37"/>
+          <p:cNvSpPr txBox="1">
+            <a:spLocks noGrp="1"/>
+          </p:cNvSpPr>
+          <p:nvPr>
+            <p:ph type="ctrTitle"/>
+          </p:nvPr>
+        </p:nvSpPr>
+        <p:spPr>
+          <a:xfrm>
+            <a:off x="2611454" y="887203"/>
+            <a:ext cx="4376703" cy="594145"/>
+          </a:xfrm>
+          <a:prstGeom prst="rect">
+            <a:avLst/>
+          </a:prstGeom>
+        </p:spPr>
+        <p:txBody>
+          <a:bodyPr spcFirstLastPara="1" wrap="square" lIns="91425" tIns="91425" rIns="91425" bIns="91425" anchor="b" anchorCtr="0">
+            <a:noAutofit/>
+          </a:bodyPr>
+          <a:lstStyle/>
+          <a:p>
+            <a:pPr marL="0" lvl="0" indent="0" algn="ctr" rtl="0">
+              <a:spcBef>
+                <a:spcPts val="0"/>
+              </a:spcBef>
+              <a:spcAft>
+                <a:spcPts val="0"/>
+              </a:spcAft>
+              <a:buNone/>
+            </a:pPr>
+            <a:r>
+              <a:rPr lang="en" dirty="0"/>
+              <a:t>Les événements</a:t>
+            </a:r>
+            <a:endParaRPr dirty="0"/>
+          </a:p>
+        </p:txBody>
+      </p:sp>
+      <p:cxnSp>
+        <p:nvCxnSpPr>
+          <p:cNvPr id="207" name="Google Shape;207;p37"/>
+          <p:cNvCxnSpPr/>
+          <p:nvPr/>
+        </p:nvCxnSpPr>
+        <p:spPr>
+          <a:xfrm>
+            <a:off x="4569600" y="1494500"/>
+            <a:ext cx="4574400" cy="0"/>
+          </a:xfrm>
+          <a:prstGeom prst="straightConnector1">
+            <a:avLst/>
+          </a:prstGeom>
+          <a:noFill/>
+          <a:ln w="9525" cap="flat" cmpd="sng">
+            <a:solidFill>
+              <a:srgbClr val="434343"/>
+            </a:solidFill>
+            <a:prstDash val="solid"/>
+            <a:round/>
+            <a:headEnd type="none" w="med" len="med"/>
+            <a:tailEnd type="none" w="med" len="med"/>
+          </a:ln>
+        </p:spPr>
+      </p:cxnSp>
+      <p:cxnSp>
+        <p:nvCxnSpPr>
+          <p:cNvPr id="208" name="Google Shape;208;p37"/>
+          <p:cNvCxnSpPr/>
+          <p:nvPr/>
+        </p:nvCxnSpPr>
+        <p:spPr>
+          <a:xfrm>
+            <a:off x="-4800" y="4927864"/>
+            <a:ext cx="4574400" cy="0"/>
+          </a:xfrm>
+          <a:prstGeom prst="straightConnector1">
+            <a:avLst/>
+          </a:prstGeom>
+          <a:noFill/>
+          <a:ln w="9525" cap="flat" cmpd="sng">
+            <a:solidFill>
+              <a:srgbClr val="434343"/>
+            </a:solidFill>
+            <a:prstDash val="solid"/>
+            <a:round/>
+            <a:headEnd type="none" w="med" len="med"/>
+            <a:tailEnd type="none" w="med" len="med"/>
+          </a:ln>
+        </p:spPr>
+      </p:cxnSp>
+      <p:pic>
+        <p:nvPicPr>
+          <p:cNvPr id="4" name="Image 3">
+            <a:hlinkClick r:id="rId3"/>
+            <a:extLst>
+              <a:ext uri="{FF2B5EF4-FFF2-40B4-BE49-F238E27FC236}">
+                <a16:creationId xmlns:a16="http://schemas.microsoft.com/office/drawing/2014/main" id="{D2B22D06-2719-4891-983E-9F19118CD354}"/>
+              </a:ext>
+            </a:extLst>
+          </p:cNvPr>
+          <p:cNvPicPr>
+            <a:picLocks noChangeAspect="1"/>
+          </p:cNvPicPr>
+          <p:nvPr/>
+        </p:nvPicPr>
+        <p:blipFill>
+          <a:blip r:embed="rId4"/>
+          <a:stretch>
+            <a:fillRect/>
+          </a:stretch>
+        </p:blipFill>
+        <p:spPr>
+          <a:xfrm>
+            <a:off x="8734425" y="0"/>
+            <a:ext cx="409575" cy="390525"/>
+          </a:xfrm>
+          <a:prstGeom prst="rect">
+            <a:avLst/>
+          </a:prstGeom>
+        </p:spPr>
+      </p:pic>
+    </p:spTree>
+    <p:extLst>
+      <p:ext uri="{BB962C8B-B14F-4D97-AF65-F5344CB8AC3E}">
+        <p14:creationId xmlns:p14="http://schemas.microsoft.com/office/powerpoint/2010/main" val="1667841977"/>
+      </p:ext>
+    </p:extLst>
+  </p:cSld>
+  <p:clrMapOvr>
+    <a:masterClrMapping/>
+  </p:clrMapOvr>
+  <p:timing>
+    <p:tnLst>
+      <p:par>
+        <p:cTn id="1" dur="indefinite" restart="never" nodeType="tmRoot">
+          <p:childTnLst>
+            <p:seq concurrent="1" nextAc="seek">
+              <p:cTn id="2" dur="indefinite" nodeType="mainSeq">
+                <p:childTnLst>
+                  <p:par>
+                    <p:cTn id="3" fill="hold">
+                      <p:stCondLst>
+                        <p:cond delay="indefinite"/>
+                        <p:cond evt="onBegin" delay="0">
+                          <p:tn val="2"/>
+                        </p:cond>
+                      </p:stCondLst>
+                      <p:childTnLst>
+                        <p:par>
+                          <p:cTn id="4" fill="hold">
+                            <p:stCondLst>
+                              <p:cond delay="0"/>
+                            </p:stCondLst>
+                            <p:childTnLst>
+                              <p:par>
+                                <p:cTn id="5" presetID="2" presetClass="entr" presetSubtype="2" fill="hold" nodeType="afterEffect">
+                                  <p:stCondLst>
+                                    <p:cond delay="0"/>
+                                  </p:stCondLst>
+                                  <p:childTnLst>
+                                    <p:set>
+                                      <p:cBhvr>
+                                        <p:cTn id="6" dur="1" fill="hold">
+                                          <p:stCondLst>
+                                            <p:cond delay="0"/>
+                                          </p:stCondLst>
+                                        </p:cTn>
+                                        <p:tgtEl>
+                                          <p:spTgt spid="207"/>
+                                        </p:tgtEl>
+                                        <p:attrNameLst>
+                                          <p:attrName>style.visibility</p:attrName>
+                                        </p:attrNameLst>
+                                      </p:cBhvr>
+                                      <p:to>
+                                        <p:strVal val="visible"/>
+                                      </p:to>
+                                    </p:set>
+                                    <p:anim calcmode="lin" valueType="num">
+                                      <p:cBhvr additive="base">
+                                        <p:cTn id="7" dur="1000"/>
+                                        <p:tgtEl>
+                                          <p:spTgt spid="207"/>
+                                        </p:tgtEl>
+                                        <p:attrNameLst>
+                                          <p:attrName>ppt_x</p:attrName>
+                                        </p:attrNameLst>
+                                      </p:cBhvr>
+                                      <p:tavLst>
+                                        <p:tav tm="0">
+                                          <p:val>
+                                            <p:strVal val="#ppt_x+1"/>
+                                          </p:val>
+                                        </p:tav>
+                                        <p:tav tm="100000">
+                                          <p:val>
+                                            <p:strVal val="#ppt_x"/>
+                                          </p:val>
+                                        </p:tav>
+                                      </p:tavLst>
+                                    </p:anim>
+                                  </p:childTnLst>
+                                </p:cTn>
+                              </p:par>
+                              <p:par>
+                                <p:cTn id="8" presetID="2" presetClass="entr" presetSubtype="8" fill="hold" nodeType="withEffect">
+                                  <p:stCondLst>
+                                    <p:cond delay="0"/>
+                                  </p:stCondLst>
+                                  <p:childTnLst>
+                                    <p:set>
+                                      <p:cBhvr>
+                                        <p:cTn id="9" dur="1" fill="hold">
+                                          <p:stCondLst>
+                                            <p:cond delay="0"/>
+                                          </p:stCondLst>
+                                        </p:cTn>
+                                        <p:tgtEl>
+                                          <p:spTgt spid="208"/>
+                                        </p:tgtEl>
+                                        <p:attrNameLst>
+                                          <p:attrName>style.visibility</p:attrName>
+                                        </p:attrNameLst>
+                                      </p:cBhvr>
+                                      <p:to>
+                                        <p:strVal val="visible"/>
+                                      </p:to>
+                                    </p:set>
+                                    <p:anim calcmode="lin" valueType="num">
+                                      <p:cBhvr additive="base">
+                                        <p:cTn id="10" dur="1000"/>
+                                        <p:tgtEl>
+                                          <p:spTgt spid="208"/>
+                                        </p:tgtEl>
+                                        <p:attrNameLst>
+                                          <p:attrName>ppt_x</p:attrName>
+                                        </p:attrNameLst>
+                                      </p:cBhvr>
+                                      <p:tavLst>
+                                        <p:tav tm="0">
+                                          <p:val>
+                                            <p:strVal val="#ppt_x-1"/>
+                                          </p:val>
+                                        </p:tav>
+                                        <p:tav tm="100000">
+                                          <p:val>
+                                            <p:strVal val="#ppt_x"/>
+                                          </p:val>
+                                        </p:tav>
+                                      </p:tavLst>
+                                    </p:anim>
+                                  </p:childTnLst>
+                                </p:cTn>
+                              </p:par>
+                            </p:childTnLst>
+                          </p:cTn>
+                        </p:par>
+                      </p:childTnLst>
+                    </p:cTn>
+                  </p:par>
+                </p:childTnLst>
+              </p:cTn>
+              <p:prevCondLst>
+                <p:cond evt="onPrev" delay="0">
+                  <p:tgtEl>
+                    <p:sldTgt/>
+                  </p:tgtEl>
+                </p:cond>
+              </p:prevCondLst>
+              <p:nextCondLst>
+                <p:cond evt="onNext" delay="0">
+                  <p:tgtEl>
+                    <p:sldTgt/>
+                  </p:tgtEl>
+                </p:cond>
+              </p:nextCondLst>
+            </p:seq>
+          </p:childTnLst>
+        </p:cTn>
+      </p:par>
+    </p:tnLst>
+  </p:timing>
+</p:sld>
+</file>
+
+<file path=ppt/slides/slide28.xml><?xml version="1.0" encoding="utf-8"?>
+<p:sld xmlns:a="http://schemas.openxmlformats.org/drawingml/2006/main" xmlns:r="http://schemas.openxmlformats.org/officeDocument/2006/relationships" xmlns:p="http://schemas.openxmlformats.org/presentationml/2006/main">
+  <p:cSld>
+    <p:spTree>
+      <p:nvGrpSpPr>
+        <p:cNvPr id="1" name="Shape 256"/>
+        <p:cNvGrpSpPr/>
+        <p:nvPr/>
+      </p:nvGrpSpPr>
+      <p:grpSpPr>
+        <a:xfrm>
+          <a:off x="0" y="0"/>
+          <a:ext cx="0" cy="0"/>
+          <a:chOff x="0" y="0"/>
+          <a:chExt cx="0" cy="0"/>
+        </a:xfrm>
+      </p:grpSpPr>
+      <p:sp>
+        <p:nvSpPr>
+          <p:cNvPr id="257" name="Google Shape;257;p41"/>
+          <p:cNvSpPr txBox="1">
+            <a:spLocks noGrp="1"/>
+          </p:cNvSpPr>
+          <p:nvPr>
+            <p:ph type="ctrTitle"/>
+          </p:nvPr>
+        </p:nvSpPr>
+        <p:spPr>
+          <a:xfrm>
+            <a:off x="1964851" y="352850"/>
+            <a:ext cx="5394508" cy="946200"/>
+          </a:xfrm>
+          <a:prstGeom prst="rect">
+            <a:avLst/>
+          </a:prstGeom>
+        </p:spPr>
+        <p:txBody>
+          <a:bodyPr spcFirstLastPara="1" wrap="square" lIns="91425" tIns="91425" rIns="91425" bIns="91425" anchor="t" anchorCtr="0">
+            <a:noAutofit/>
+          </a:bodyPr>
+          <a:lstStyle/>
+          <a:p>
+            <a:pPr marL="0" lvl="0" indent="0" algn="ctr" rtl="0">
+              <a:spcBef>
+                <a:spcPts val="0"/>
+              </a:spcBef>
+              <a:spcAft>
+                <a:spcPts val="0"/>
+              </a:spcAft>
+              <a:buNone/>
+            </a:pPr>
+            <a:r>
+              <a:rPr lang="en" dirty="0"/>
+              <a:t>Les événements – cas pratique</a:t>
+            </a:r>
+            <a:endParaRPr dirty="0"/>
+          </a:p>
+        </p:txBody>
+      </p:sp>
+      <p:sp>
+        <p:nvSpPr>
+          <p:cNvPr id="258" name="Google Shape;258;p41"/>
+          <p:cNvSpPr txBox="1"/>
+          <p:nvPr/>
+        </p:nvSpPr>
+        <p:spPr>
+          <a:xfrm>
+            <a:off x="4821002" y="2130874"/>
+            <a:ext cx="4385819" cy="2390325"/>
+          </a:xfrm>
+          <a:prstGeom prst="rect">
+            <a:avLst/>
+          </a:prstGeom>
+          <a:noFill/>
+          <a:ln>
+            <a:noFill/>
+          </a:ln>
+        </p:spPr>
+        <p:txBody>
+          <a:bodyPr spcFirstLastPara="1" wrap="square" lIns="91425" tIns="91425" rIns="91425" bIns="91425" anchor="t" anchorCtr="0">
+            <a:noAutofit/>
+          </a:bodyPr>
+          <a:lstStyle/>
+          <a:p>
+            <a:pPr marL="0" lvl="0" indent="0" algn="l" rtl="0">
+              <a:spcBef>
+                <a:spcPts val="0"/>
+              </a:spcBef>
+              <a:spcAft>
+                <a:spcPts val="0"/>
+              </a:spcAft>
+              <a:buNone/>
+            </a:pPr>
+            <a:endParaRPr dirty="0">
+              <a:latin typeface="Roboto Condensed Light"/>
+              <a:ea typeface="Roboto Condensed Light"/>
+              <a:cs typeface="Roboto Condensed Light"/>
+              <a:sym typeface="Roboto Condensed Light"/>
+            </a:endParaRPr>
+          </a:p>
+        </p:txBody>
+      </p:sp>
+      <p:cxnSp>
+        <p:nvCxnSpPr>
+          <p:cNvPr id="260" name="Google Shape;260;p41"/>
+          <p:cNvCxnSpPr>
+            <a:cxnSpLocks/>
+          </p:cNvCxnSpPr>
+          <p:nvPr/>
+        </p:nvCxnSpPr>
+        <p:spPr>
+          <a:xfrm>
+            <a:off x="2558572" y="2130874"/>
+            <a:ext cx="5543281" cy="1"/>
+          </a:xfrm>
+          <a:prstGeom prst="straightConnector1">
+            <a:avLst/>
+          </a:prstGeom>
+          <a:noFill/>
+          <a:ln w="9525" cap="flat" cmpd="sng">
+            <a:solidFill>
+              <a:srgbClr val="434343"/>
+            </a:solidFill>
+            <a:prstDash val="solid"/>
+            <a:round/>
+            <a:headEnd type="none" w="med" len="med"/>
+            <a:tailEnd type="none" w="med" len="med"/>
+          </a:ln>
+        </p:spPr>
+      </p:cxnSp>
+      <p:sp>
+        <p:nvSpPr>
+          <p:cNvPr id="10" name="Google Shape;259;p41">
+            <a:extLst>
+              <a:ext uri="{FF2B5EF4-FFF2-40B4-BE49-F238E27FC236}">
+                <a16:creationId xmlns:a16="http://schemas.microsoft.com/office/drawing/2014/main" id="{73A6E311-9053-4529-98E9-33185D6DE1C4}"/>
+              </a:ext>
+            </a:extLst>
+          </p:cNvPr>
+          <p:cNvSpPr txBox="1"/>
+          <p:nvPr/>
+        </p:nvSpPr>
+        <p:spPr>
+          <a:xfrm>
+            <a:off x="2927989" y="1416517"/>
+            <a:ext cx="5491609" cy="644700"/>
+          </a:xfrm>
+          <a:prstGeom prst="rect">
+            <a:avLst/>
+          </a:prstGeom>
+          <a:noFill/>
+          <a:ln>
+            <a:noFill/>
+          </a:ln>
+        </p:spPr>
+        <p:txBody>
+          <a:bodyPr spcFirstLastPara="1" wrap="square" lIns="91425" tIns="91425" rIns="91425" bIns="91425" anchor="b" anchorCtr="0">
+            <a:noAutofit/>
+          </a:bodyPr>
+          <a:lstStyle/>
+          <a:p>
+            <a:pPr marL="0" lvl="0" indent="0" algn="l" rtl="0">
+              <a:spcBef>
+                <a:spcPts val="0"/>
+              </a:spcBef>
+              <a:spcAft>
+                <a:spcPts val="0"/>
+              </a:spcAft>
+              <a:buNone/>
+            </a:pPr>
+            <a:r>
+              <a:rPr lang="en" sz="2000" b="1" dirty="0">
+                <a:solidFill>
+                  <a:srgbClr val="434343"/>
+                </a:solidFill>
+                <a:latin typeface="Exo 2"/>
+                <a:ea typeface="Exo 2"/>
+                <a:cs typeface="Exo 2"/>
+                <a:sym typeface="Exo 2"/>
+              </a:rPr>
+              <a:t>Débutons par un exemple commun, le click :</a:t>
+            </a:r>
+            <a:endParaRPr sz="2000" b="1" dirty="0">
+              <a:solidFill>
+                <a:srgbClr val="434343"/>
+              </a:solidFill>
+              <a:latin typeface="Exo 2"/>
+              <a:ea typeface="Exo 2"/>
+              <a:cs typeface="Exo 2"/>
+              <a:sym typeface="Exo 2"/>
+            </a:endParaRPr>
+          </a:p>
+        </p:txBody>
+      </p:sp>
+      <p:sp>
+        <p:nvSpPr>
+          <p:cNvPr id="7" name="Rectangle 6">
+            <a:extLst>
+              <a:ext uri="{FF2B5EF4-FFF2-40B4-BE49-F238E27FC236}">
+                <a16:creationId xmlns:a16="http://schemas.microsoft.com/office/drawing/2014/main" id="{BAE243F7-00A1-4EF6-B3C6-7EFB43C684AF}"/>
+              </a:ext>
+            </a:extLst>
+          </p:cNvPr>
+          <p:cNvSpPr/>
+          <p:nvPr/>
+        </p:nvSpPr>
+        <p:spPr>
+          <a:xfrm>
+            <a:off x="329110" y="2766873"/>
+            <a:ext cx="6969737" cy="307777"/>
+          </a:xfrm>
+          <a:prstGeom prst="rect">
+            <a:avLst/>
+          </a:prstGeom>
+        </p:spPr>
+        <p:txBody>
+          <a:bodyPr wrap="square">
+            <a:spAutoFit/>
+          </a:bodyPr>
+          <a:lstStyle/>
+          <a:p>
+            <a:r>
+              <a:rPr lang="en" dirty="0">
+                <a:latin typeface="Roboto Condensed Light"/>
+                <a:ea typeface="Roboto Condensed Light"/>
+                <a:cs typeface="Roboto Condensed Light"/>
+                <a:sym typeface="Roboto Condensed Light"/>
+              </a:rPr>
+              <a:t>Ouvrons un nous Codepen :</a:t>
+            </a:r>
+            <a:endParaRPr lang="fr-FR" dirty="0"/>
+          </a:p>
+        </p:txBody>
+      </p:sp>
+      <p:sp>
+        <p:nvSpPr>
+          <p:cNvPr id="15" name="Rectangle 14">
+            <a:extLst>
+              <a:ext uri="{FF2B5EF4-FFF2-40B4-BE49-F238E27FC236}">
+                <a16:creationId xmlns:a16="http://schemas.microsoft.com/office/drawing/2014/main" id="{9851F44D-20C7-4D97-BEDE-3CBFC175D22D}"/>
+              </a:ext>
+            </a:extLst>
+          </p:cNvPr>
+          <p:cNvSpPr/>
+          <p:nvPr/>
+        </p:nvSpPr>
+        <p:spPr>
+          <a:xfrm>
+            <a:off x="329110" y="3144307"/>
+            <a:ext cx="6969737" cy="954107"/>
+          </a:xfrm>
+          <a:prstGeom prst="rect">
+            <a:avLst/>
+          </a:prstGeom>
+        </p:spPr>
+        <p:txBody>
+          <a:bodyPr wrap="square">
+            <a:spAutoFit/>
+          </a:bodyPr>
+          <a:lstStyle/>
+          <a:p>
+            <a:r>
+              <a:rPr lang="fr-FR" dirty="0">
+                <a:solidFill>
+                  <a:schemeClr val="tx1">
+                    <a:lumMod val="75000"/>
+                    <a:lumOff val="25000"/>
+                  </a:schemeClr>
+                </a:solidFill>
+                <a:latin typeface="Roboto Condensed Light" panose="02000000000000000000" pitchFamily="2" charset="0"/>
+                <a:ea typeface="Roboto Condensed Light" panose="02000000000000000000" pitchFamily="2" charset="0"/>
+              </a:rPr>
+              <a:t>Commençons tout d’abord par ouvrir un nouveau projet dans </a:t>
+            </a:r>
+            <a:r>
+              <a:rPr lang="fr-FR" dirty="0" err="1">
+                <a:solidFill>
+                  <a:schemeClr val="tx1">
+                    <a:lumMod val="75000"/>
+                    <a:lumOff val="25000"/>
+                  </a:schemeClr>
+                </a:solidFill>
+                <a:latin typeface="Roboto Condensed Light" panose="02000000000000000000" pitchFamily="2" charset="0"/>
+                <a:ea typeface="Roboto Condensed Light" panose="02000000000000000000" pitchFamily="2" charset="0"/>
+              </a:rPr>
+              <a:t>Codepen</a:t>
+            </a:r>
+            <a:br>
+              <a:rPr lang="fr-FR" dirty="0">
+                <a:solidFill>
+                  <a:schemeClr val="tx1">
+                    <a:lumMod val="75000"/>
+                    <a:lumOff val="25000"/>
+                  </a:schemeClr>
+                </a:solidFill>
+                <a:latin typeface="Roboto Condensed Light" panose="02000000000000000000" pitchFamily="2" charset="0"/>
+                <a:ea typeface="Roboto Condensed Light" panose="02000000000000000000" pitchFamily="2" charset="0"/>
+              </a:rPr>
+            </a:br>
+            <a:r>
+              <a:rPr lang="fr-FR" dirty="0">
+                <a:solidFill>
+                  <a:schemeClr val="tx1">
+                    <a:lumMod val="75000"/>
+                    <a:lumOff val="25000"/>
+                  </a:schemeClr>
+                </a:solidFill>
+                <a:latin typeface="Roboto Condensed Light" panose="02000000000000000000" pitchFamily="2" charset="0"/>
+                <a:ea typeface="Roboto Condensed Light" panose="02000000000000000000" pitchFamily="2" charset="0"/>
+              </a:rPr>
+              <a:t>Dans un premier temps nous allons créer l’élément du DOM qui nous permettra de déclencher un événement. Dans un second temps, nous allons rattacher la cible du DOM avec notre écouteur d’événement. Nous allons le faire avec </a:t>
+            </a:r>
+            <a:r>
+              <a:rPr lang="fr-FR" dirty="0" err="1">
+                <a:solidFill>
+                  <a:schemeClr val="tx1">
+                    <a:lumMod val="75000"/>
+                    <a:lumOff val="25000"/>
+                  </a:schemeClr>
+                </a:solidFill>
+                <a:latin typeface="Roboto Condensed Light" panose="02000000000000000000" pitchFamily="2" charset="0"/>
+                <a:ea typeface="Roboto Condensed Light" panose="02000000000000000000" pitchFamily="2" charset="0"/>
+              </a:rPr>
+              <a:t>Vanilla</a:t>
+            </a:r>
+            <a:r>
+              <a:rPr lang="fr-FR" dirty="0">
+                <a:solidFill>
+                  <a:schemeClr val="tx1">
+                    <a:lumMod val="75000"/>
+                    <a:lumOff val="25000"/>
+                  </a:schemeClr>
+                </a:solidFill>
+                <a:latin typeface="Roboto Condensed Light" panose="02000000000000000000" pitchFamily="2" charset="0"/>
+                <a:ea typeface="Roboto Condensed Light" panose="02000000000000000000" pitchFamily="2" charset="0"/>
+              </a:rPr>
+              <a:t> et ensuite jQuery.</a:t>
+            </a:r>
+          </a:p>
+        </p:txBody>
+      </p:sp>
+    </p:spTree>
+    <p:extLst>
+      <p:ext uri="{BB962C8B-B14F-4D97-AF65-F5344CB8AC3E}">
+        <p14:creationId xmlns:p14="http://schemas.microsoft.com/office/powerpoint/2010/main" val="3650543326"/>
       </p:ext>
     </p:extLst>
   </p:cSld>

</xml_diff>